<commit_message>
Projects and Git PPT
</commit_message>
<xml_diff>
--- a/OOPs/Python_OOPs.pptx
+++ b/OOPs/Python_OOPs.pptx
@@ -231,7 +231,7 @@
           <a:p>
             <a:fld id="{70D278F6-464A-4FB7-94FA-4B60AE5A7A96}" type="datetimeFigureOut">
               <a:rPr lang="en-IN" smtClean="0"/>
-              <a:t>23-12-2020</a:t>
+              <a:t>28-12-2020</a:t>
             </a:fld>
             <a:endParaRPr lang="en-IN"/>
           </a:p>
@@ -893,7 +893,7 @@
           <a:p>
             <a:fld id="{B077CACF-C581-425F-9DD1-3DF35D874BA5}" type="datetimeFigureOut">
               <a:rPr lang="en-IN" smtClean="0"/>
-              <a:t>23-12-2020</a:t>
+              <a:t>28-12-2020</a:t>
             </a:fld>
             <a:endParaRPr lang="en-IN"/>
           </a:p>
@@ -1101,7 +1101,7 @@
           <a:p>
             <a:fld id="{B077CACF-C581-425F-9DD1-3DF35D874BA5}" type="datetimeFigureOut">
               <a:rPr lang="en-IN" smtClean="0"/>
-              <a:t>23-12-2020</a:t>
+              <a:t>28-12-2020</a:t>
             </a:fld>
             <a:endParaRPr lang="en-IN"/>
           </a:p>
@@ -1357,7 +1357,7 @@
           <a:p>
             <a:fld id="{B077CACF-C581-425F-9DD1-3DF35D874BA5}" type="datetimeFigureOut">
               <a:rPr lang="en-IN" smtClean="0"/>
-              <a:t>23-12-2020</a:t>
+              <a:t>28-12-2020</a:t>
             </a:fld>
             <a:endParaRPr lang="en-IN"/>
           </a:p>
@@ -1531,7 +1531,7 @@
           <a:p>
             <a:fld id="{B077CACF-C581-425F-9DD1-3DF35D874BA5}" type="datetimeFigureOut">
               <a:rPr lang="en-IN" smtClean="0"/>
-              <a:t>23-12-2020</a:t>
+              <a:t>28-12-2020</a:t>
             </a:fld>
             <a:endParaRPr lang="en-IN"/>
           </a:p>
@@ -1874,7 +1874,7 @@
           <a:p>
             <a:fld id="{B077CACF-C581-425F-9DD1-3DF35D874BA5}" type="datetimeFigureOut">
               <a:rPr lang="en-IN" smtClean="0"/>
-              <a:t>23-12-2020</a:t>
+              <a:t>28-12-2020</a:t>
             </a:fld>
             <a:endParaRPr lang="en-IN"/>
           </a:p>
@@ -2149,7 +2149,7 @@
           <a:p>
             <a:fld id="{B077CACF-C581-425F-9DD1-3DF35D874BA5}" type="datetimeFigureOut">
               <a:rPr lang="en-IN" smtClean="0"/>
-              <a:t>23-12-2020</a:t>
+              <a:t>28-12-2020</a:t>
             </a:fld>
             <a:endParaRPr lang="en-IN"/>
           </a:p>
@@ -2528,7 +2528,7 @@
           <a:p>
             <a:fld id="{B077CACF-C581-425F-9DD1-3DF35D874BA5}" type="datetimeFigureOut">
               <a:rPr lang="en-IN" smtClean="0"/>
-              <a:t>23-12-2020</a:t>
+              <a:t>28-12-2020</a:t>
             </a:fld>
             <a:endParaRPr lang="en-IN"/>
           </a:p>
@@ -2646,7 +2646,7 @@
           <a:p>
             <a:fld id="{B077CACF-C581-425F-9DD1-3DF35D874BA5}" type="datetimeFigureOut">
               <a:rPr lang="en-IN" smtClean="0"/>
-              <a:t>23-12-2020</a:t>
+              <a:t>28-12-2020</a:t>
             </a:fld>
             <a:endParaRPr lang="en-IN"/>
           </a:p>
@@ -2817,7 +2817,7 @@
           <a:p>
             <a:fld id="{B077CACF-C581-425F-9DD1-3DF35D874BA5}" type="datetimeFigureOut">
               <a:rPr lang="en-IN" smtClean="0"/>
-              <a:t>23-12-2020</a:t>
+              <a:t>28-12-2020</a:t>
             </a:fld>
             <a:endParaRPr lang="en-IN"/>
           </a:p>
@@ -3171,7 +3171,7 @@
           <a:p>
             <a:fld id="{B077CACF-C581-425F-9DD1-3DF35D874BA5}" type="datetimeFigureOut">
               <a:rPr lang="en-IN" smtClean="0"/>
-              <a:t>23-12-2020</a:t>
+              <a:t>28-12-2020</a:t>
             </a:fld>
             <a:endParaRPr lang="en-IN"/>
           </a:p>
@@ -3553,7 +3553,7 @@
           <a:p>
             <a:fld id="{B077CACF-C581-425F-9DD1-3DF35D874BA5}" type="datetimeFigureOut">
               <a:rPr lang="en-IN" smtClean="0"/>
-              <a:t>23-12-2020</a:t>
+              <a:t>28-12-2020</a:t>
             </a:fld>
             <a:endParaRPr lang="en-IN"/>
           </a:p>
@@ -3840,7 +3840,7 @@
           <a:p>
             <a:fld id="{B077CACF-C581-425F-9DD1-3DF35D874BA5}" type="datetimeFigureOut">
               <a:rPr lang="en-IN" smtClean="0"/>
-              <a:t>23-12-2020</a:t>
+              <a:t>28-12-2020</a:t>
             </a:fld>
             <a:endParaRPr lang="en-IN"/>
           </a:p>

</xml_diff>